<commit_message>
corection de presentation autre fois
</commit_message>
<xml_diff>
--- a/Rapport PFE/Presentation_final.pptx
+++ b/Rapport PFE/Presentation_final.pptx
@@ -3044,10 +3044,10 @@
       </p:sp>
       <p:pic>
         <p:nvPicPr>
-          <p:cNvPr id="5" name="Picture 2">
-            <a:extLst>
-              <a:ext uri="{FF2B5EF4-FFF2-40B4-BE49-F238E27FC236}">
-                <a16:creationId xmlns:a16="http://schemas.microsoft.com/office/drawing/2014/main" id="{EC85EF77-F061-12B6-2FA2-6FBCC9726CDA}"/>
+          <p:cNvPr id="3" name="Picture 6">
+            <a:extLst>
+              <a:ext uri="{FF2B5EF4-FFF2-40B4-BE49-F238E27FC236}">
+                <a16:creationId xmlns:a16="http://schemas.microsoft.com/office/drawing/2014/main" id="{596FE9D2-DB4B-2E21-26C2-E738FA8A5772}"/>
               </a:ext>
             </a:extLst>
           </p:cNvPr>
@@ -3070,8 +3070,8 @@
         </p:blipFill>
         <p:spPr>
           <a:xfrm>
-            <a:off x="2119944" y="782707"/>
-            <a:ext cx="10390512" cy="7283381"/>
+            <a:off x="990380" y="1171662"/>
+            <a:ext cx="12649640" cy="5886275"/>
           </a:xfrm>
           <a:prstGeom prst="rect">
             <a:avLst/>
@@ -6283,7 +6283,7 @@
         <p:spPr>
           <a:xfrm>
             <a:off x="1769807" y="914418"/>
-            <a:ext cx="3762568" cy="707886"/>
+            <a:ext cx="4859022" cy="707886"/>
           </a:xfrm>
           <a:prstGeom prst="rect">
             <a:avLst/>
@@ -6300,7 +6300,7 @@
               <a:rPr lang="fr-FR" sz="4000" b="1" dirty="0">
                 <a:latin typeface="Montserrat" panose="00000500000000000000" pitchFamily="2" charset="0"/>
               </a:rPr>
-              <a:t>7. Réalisation</a:t>
+              <a:t>7. Démonstration</a:t>
             </a:r>
           </a:p>
         </p:txBody>

</xml_diff>

<commit_message>
ajouter action voir et suprimer
</commit_message>
<xml_diff>
--- a/Rapport PFE/Presentation_final.pptx
+++ b/Rapport PFE/Presentation_final.pptx
@@ -4361,7 +4361,7 @@
         <p:spPr>
           <a:xfrm>
             <a:off x="5225664" y="6176543"/>
-            <a:ext cx="1526380" cy="369332"/>
+            <a:ext cx="2020105" cy="369332"/>
           </a:xfrm>
           <a:prstGeom prst="rect">
             <a:avLst/>
@@ -4375,11 +4375,14 @@
           <a:lstStyle/>
           <a:p>
             <a:r>
-              <a:rPr lang="fr-FR" b="1" dirty="0">
-                <a:latin typeface="Montserrat" panose="00000500000000000000" pitchFamily="2" charset="0"/>
-              </a:rPr>
-              <a:t>Réalisation</a:t>
-            </a:r>
+              <a:rPr lang="fr-FR" sz="1800" b="1" dirty="0">
+                <a:latin typeface="Montserrat" panose="00000500000000000000" pitchFamily="2" charset="0"/>
+              </a:rPr>
+              <a:t>Démonstration</a:t>
+            </a:r>
+            <a:endParaRPr lang="fr-FR" b="1" dirty="0">
+              <a:latin typeface="Montserrat" panose="00000500000000000000" pitchFamily="2" charset="0"/>
+            </a:endParaRPr>
           </a:p>
         </p:txBody>
       </p:sp>

</xml_diff>